<commit_message>
Update PowerPoint, GraphiQL examples, and Titles query.
</commit_message>
<xml_diff>
--- a/GraphQL_and_GraphQL.NET.pptx
+++ b/GraphQL_and_GraphQL.NET.pptx
@@ -251,7 +251,7 @@
           <a:p>
             <a:fld id="{CF31C504-415A-47B0-9903-84D73EF3693F}" type="datetimeFigureOut">
               <a:rPr lang="en-US" smtClean="0"/>
-              <a:t>10/12/2019</a:t>
+              <a:t>11/21/2019</a:t>
             </a:fld>
             <a:endParaRPr lang="en-US"/>
           </a:p>
@@ -1023,7 +1023,7 @@
           <a:p>
             <a:fld id="{BC883F42-091B-43F3-A5E7-5DE2128B227B}" type="datetimeFigureOut">
               <a:rPr lang="en-US" smtClean="0"/>
-              <a:t>10/12/2019</a:t>
+              <a:t>11/21/2019</a:t>
             </a:fld>
             <a:endParaRPr lang="en-US"/>
           </a:p>
@@ -1298,7 +1298,7 @@
           <a:p>
             <a:fld id="{BC883F42-091B-43F3-A5E7-5DE2128B227B}" type="datetimeFigureOut">
               <a:rPr lang="en-US" smtClean="0"/>
-              <a:t>10/12/2019</a:t>
+              <a:t>11/21/2019</a:t>
             </a:fld>
             <a:endParaRPr lang="en-US"/>
           </a:p>
@@ -1492,7 +1492,7 @@
           <a:p>
             <a:fld id="{BC883F42-091B-43F3-A5E7-5DE2128B227B}" type="datetimeFigureOut">
               <a:rPr lang="en-US" smtClean="0"/>
-              <a:t>10/12/2019</a:t>
+              <a:t>11/21/2019</a:t>
             </a:fld>
             <a:endParaRPr lang="en-US"/>
           </a:p>
@@ -1765,7 +1765,7 @@
           <a:p>
             <a:fld id="{BC883F42-091B-43F3-A5E7-5DE2128B227B}" type="datetimeFigureOut">
               <a:rPr lang="en-US" smtClean="0"/>
-              <a:t>10/12/2019</a:t>
+              <a:t>11/21/2019</a:t>
             </a:fld>
             <a:endParaRPr lang="en-US"/>
           </a:p>
@@ -2106,7 +2106,7 @@
           <a:p>
             <a:fld id="{BC883F42-091B-43F3-A5E7-5DE2128B227B}" type="datetimeFigureOut">
               <a:rPr lang="en-US" smtClean="0"/>
-              <a:t>10/12/2019</a:t>
+              <a:t>11/21/2019</a:t>
             </a:fld>
             <a:endParaRPr lang="en-US"/>
           </a:p>
@@ -2729,7 +2729,7 @@
           <a:p>
             <a:fld id="{BC883F42-091B-43F3-A5E7-5DE2128B227B}" type="datetimeFigureOut">
               <a:rPr lang="en-US" smtClean="0"/>
-              <a:t>10/12/2019</a:t>
+              <a:t>11/21/2019</a:t>
             </a:fld>
             <a:endParaRPr lang="en-US"/>
           </a:p>
@@ -3589,7 +3589,7 @@
           <a:p>
             <a:fld id="{BC883F42-091B-43F3-A5E7-5DE2128B227B}" type="datetimeFigureOut">
               <a:rPr lang="en-US" smtClean="0"/>
-              <a:t>10/12/2019</a:t>
+              <a:t>11/21/2019</a:t>
             </a:fld>
             <a:endParaRPr lang="en-US"/>
           </a:p>
@@ -3759,7 +3759,7 @@
           <a:p>
             <a:fld id="{BC883F42-091B-43F3-A5E7-5DE2128B227B}" type="datetimeFigureOut">
               <a:rPr lang="en-US" smtClean="0"/>
-              <a:t>10/12/2019</a:t>
+              <a:t>11/21/2019</a:t>
             </a:fld>
             <a:endParaRPr lang="en-US"/>
           </a:p>
@@ -3939,7 +3939,7 @@
           <a:p>
             <a:fld id="{BC883F42-091B-43F3-A5E7-5DE2128B227B}" type="datetimeFigureOut">
               <a:rPr lang="en-US" smtClean="0"/>
-              <a:t>10/12/2019</a:t>
+              <a:t>11/21/2019</a:t>
             </a:fld>
             <a:endParaRPr lang="en-US"/>
           </a:p>
@@ -4109,7 +4109,7 @@
           <a:p>
             <a:fld id="{BC883F42-091B-43F3-A5E7-5DE2128B227B}" type="datetimeFigureOut">
               <a:rPr lang="en-US" smtClean="0"/>
-              <a:t>10/12/2019</a:t>
+              <a:t>11/21/2019</a:t>
             </a:fld>
             <a:endParaRPr lang="en-US"/>
           </a:p>
@@ -4356,7 +4356,7 @@
           <a:p>
             <a:fld id="{BC883F42-091B-43F3-A5E7-5DE2128B227B}" type="datetimeFigureOut">
               <a:rPr lang="en-US" smtClean="0"/>
-              <a:t>10/12/2019</a:t>
+              <a:t>11/21/2019</a:t>
             </a:fld>
             <a:endParaRPr lang="en-US"/>
           </a:p>
@@ -4648,7 +4648,7 @@
           <a:p>
             <a:fld id="{BC883F42-091B-43F3-A5E7-5DE2128B227B}" type="datetimeFigureOut">
               <a:rPr lang="en-US" smtClean="0"/>
-              <a:t>10/12/2019</a:t>
+              <a:t>11/21/2019</a:t>
             </a:fld>
             <a:endParaRPr lang="en-US"/>
           </a:p>
@@ -5092,7 +5092,7 @@
           <a:p>
             <a:fld id="{BC883F42-091B-43F3-A5E7-5DE2128B227B}" type="datetimeFigureOut">
               <a:rPr lang="en-US" smtClean="0"/>
-              <a:t>10/12/2019</a:t>
+              <a:t>11/21/2019</a:t>
             </a:fld>
             <a:endParaRPr lang="en-US"/>
           </a:p>
@@ -5210,7 +5210,7 @@
           <a:p>
             <a:fld id="{BC883F42-091B-43F3-A5E7-5DE2128B227B}" type="datetimeFigureOut">
               <a:rPr lang="en-US" smtClean="0"/>
-              <a:t>10/12/2019</a:t>
+              <a:t>11/21/2019</a:t>
             </a:fld>
             <a:endParaRPr lang="en-US"/>
           </a:p>
@@ -5305,7 +5305,7 @@
           <a:p>
             <a:fld id="{BC883F42-091B-43F3-A5E7-5DE2128B227B}" type="datetimeFigureOut">
               <a:rPr lang="en-US" smtClean="0"/>
-              <a:t>10/12/2019</a:t>
+              <a:t>11/21/2019</a:t>
             </a:fld>
             <a:endParaRPr lang="en-US"/>
           </a:p>
@@ -5584,7 +5584,7 @@
           <a:p>
             <a:fld id="{BC883F42-091B-43F3-A5E7-5DE2128B227B}" type="datetimeFigureOut">
               <a:rPr lang="en-US" smtClean="0"/>
-              <a:t>10/12/2019</a:t>
+              <a:t>11/21/2019</a:t>
             </a:fld>
             <a:endParaRPr lang="en-US"/>
           </a:p>
@@ -5859,7 +5859,7 @@
           <a:p>
             <a:fld id="{BC883F42-091B-43F3-A5E7-5DE2128B227B}" type="datetimeFigureOut">
               <a:rPr lang="en-US" smtClean="0"/>
-              <a:t>10/12/2019</a:t>
+              <a:t>11/21/2019</a:t>
             </a:fld>
             <a:endParaRPr lang="en-US"/>
           </a:p>
@@ -6288,7 +6288,7 @@
           <a:p>
             <a:fld id="{BC883F42-091B-43F3-A5E7-5DE2128B227B}" type="datetimeFigureOut">
               <a:rPr lang="en-US" smtClean="0"/>
-              <a:t>10/12/2019</a:t>
+              <a:t>11/21/2019</a:t>
             </a:fld>
             <a:endParaRPr lang="en-US"/>
           </a:p>
@@ -10786,106 +10786,6 @@
       </p:sp>
       <p:sp>
         <p:nvSpPr>
-          <p:cNvPr id="7" name="TextBox 6">
-            <a:extLst>
-              <a:ext uri="{FF2B5EF4-FFF2-40B4-BE49-F238E27FC236}">
-                <a16:creationId xmlns:a16="http://schemas.microsoft.com/office/drawing/2014/main" id="{113A8CE3-C478-4CF5-BDCF-870BDB83DACF}"/>
-              </a:ext>
-            </a:extLst>
-          </p:cNvPr>
-          <p:cNvSpPr txBox="1"/>
-          <p:nvPr/>
-        </p:nvSpPr>
-        <p:spPr>
-          <a:xfrm>
-            <a:off x="3296677" y="3582954"/>
-            <a:ext cx="4103589" cy="2031325"/>
-          </a:xfrm>
-          <a:prstGeom prst="rect">
-            <a:avLst/>
-          </a:prstGeom>
-          <a:noFill/>
-        </p:spPr>
-        <p:txBody>
-          <a:bodyPr wrap="square" rtlCol="0">
-            <a:spAutoFit/>
-          </a:bodyPr>
-          <a:lstStyle/>
-          <a:p>
-            <a:r>
-              <a:rPr lang="en-US" dirty="0"/>
-              <a:t>function </a:t>
-            </a:r>
-            <a:r>
-              <a:rPr lang="en-US" dirty="0" err="1"/>
-              <a:t>Query_me</a:t>
-            </a:r>
-            <a:r>
-              <a:rPr lang="en-US" dirty="0"/>
-              <a:t>(request) {</a:t>
-            </a:r>
-          </a:p>
-          <a:p>
-            <a:r>
-              <a:rPr lang="en-US" dirty="0"/>
-              <a:t>  return </a:t>
-            </a:r>
-            <a:r>
-              <a:rPr lang="en-US" dirty="0" err="1"/>
-              <a:t>request.auth.user</a:t>
-            </a:r>
-            <a:r>
-              <a:rPr lang="en-US" dirty="0"/>
-              <a:t>;</a:t>
-            </a:r>
-          </a:p>
-          <a:p>
-            <a:r>
-              <a:rPr lang="en-US" dirty="0"/>
-              <a:t>}</a:t>
-            </a:r>
-          </a:p>
-          <a:p>
-            <a:endParaRPr lang="en-US" dirty="0"/>
-          </a:p>
-          <a:p>
-            <a:r>
-              <a:rPr lang="en-US" dirty="0"/>
-              <a:t>function </a:t>
-            </a:r>
-            <a:r>
-              <a:rPr lang="en-US" dirty="0" err="1"/>
-              <a:t>User_name</a:t>
-            </a:r>
-            <a:r>
-              <a:rPr lang="en-US" dirty="0"/>
-              <a:t>(user) {</a:t>
-            </a:r>
-          </a:p>
-          <a:p>
-            <a:r>
-              <a:rPr lang="en-US" dirty="0"/>
-              <a:t>  return </a:t>
-            </a:r>
-            <a:r>
-              <a:rPr lang="en-US" dirty="0" err="1"/>
-              <a:t>user.getName</a:t>
-            </a:r>
-            <a:r>
-              <a:rPr lang="en-US" dirty="0"/>
-              <a:t>();</a:t>
-            </a:r>
-          </a:p>
-          <a:p>
-            <a:r>
-              <a:rPr lang="en-US" dirty="0"/>
-              <a:t>}</a:t>
-            </a:r>
-          </a:p>
-        </p:txBody>
-      </p:sp>
-      <p:sp>
-        <p:nvSpPr>
           <p:cNvPr id="8" name="TextBox 7">
             <a:extLst>
               <a:ext uri="{FF2B5EF4-FFF2-40B4-BE49-F238E27FC236}">
@@ -10898,7 +10798,7 @@
         </p:nvSpPr>
         <p:spPr>
           <a:xfrm>
-            <a:off x="7016620" y="3582953"/>
+            <a:off x="4885980" y="3733874"/>
             <a:ext cx="1810139" cy="2031325"/>
           </a:xfrm>
           <a:prstGeom prst="rect">

</xml_diff>